<commit_message>
chapter 2 update with RAT plot
</commit_message>
<xml_diff>
--- a/plots.pptx
+++ b/plots.pptx
@@ -115,7 +115,7 @@
 <file path=ppt/revisionInfo.xml><?xml version="1.0" encoding="utf-8"?>
 <p1510:revInfo xmlns:a="http://schemas.openxmlformats.org/drawingml/2006/main" xmlns:r="http://schemas.openxmlformats.org/officeDocument/2006/relationships" xmlns:p1510="http://schemas.microsoft.com/office/powerpoint/2015/10/main">
   <p1510:revLst>
-    <p1510:client id="{26AAD9E8-4C42-4DE7-94A5-14A70A065374}" v="112" dt="2024-02-06T15:07:02.436"/>
+    <p1510:client id="{26AAD9E8-4C42-4DE7-94A5-14A70A065374}" v="115" dt="2024-02-07T12:38:46.059"/>
   </p1510:revLst>
 </p1510:revInfo>
 </file>
@@ -125,12 +125,12 @@
   <pc:docChgLst>
     <pc:chgData name="Sehgal, Vinit" userId="ef721694-8436-4df6-8b9b-be9691359d6c" providerId="ADAL" clId="{26AAD9E8-4C42-4DE7-94A5-14A70A065374}"/>
     <pc:docChg chg="undo custSel addSld modSld">
-      <pc:chgData name="Sehgal, Vinit" userId="ef721694-8436-4df6-8b9b-be9691359d6c" providerId="ADAL" clId="{26AAD9E8-4C42-4DE7-94A5-14A70A065374}" dt="2024-02-06T15:08:03.746" v="828" actId="20577"/>
+      <pc:chgData name="Sehgal, Vinit" userId="ef721694-8436-4df6-8b9b-be9691359d6c" providerId="ADAL" clId="{26AAD9E8-4C42-4DE7-94A5-14A70A065374}" dt="2024-02-07T12:39:06.825" v="866" actId="14100"/>
       <pc:docMkLst>
         <pc:docMk/>
       </pc:docMkLst>
       <pc:sldChg chg="addSp delSp modSp new mod">
-        <pc:chgData name="Sehgal, Vinit" userId="ef721694-8436-4df6-8b9b-be9691359d6c" providerId="ADAL" clId="{26AAD9E8-4C42-4DE7-94A5-14A70A065374}" dt="2024-02-06T15:08:03.746" v="828" actId="20577"/>
+        <pc:chgData name="Sehgal, Vinit" userId="ef721694-8436-4df6-8b9b-be9691359d6c" providerId="ADAL" clId="{26AAD9E8-4C42-4DE7-94A5-14A70A065374}" dt="2024-02-07T12:39:06.825" v="866" actId="14100"/>
         <pc:sldMkLst>
           <pc:docMk/>
           <pc:sldMk cId="232067652" sldId="256"/>
@@ -151,6 +151,14 @@
             <ac:spMk id="2" creationId="{5A35EEE2-3FEF-E3E4-EDF0-7B6110416FC8}"/>
           </ac:spMkLst>
         </pc:spChg>
+        <pc:spChg chg="add">
+          <ac:chgData name="Sehgal, Vinit" userId="ef721694-8436-4df6-8b9b-be9691359d6c" providerId="ADAL" clId="{26AAD9E8-4C42-4DE7-94A5-14A70A065374}" dt="2024-02-07T12:38:41.842" v="855"/>
+          <ac:spMkLst>
+            <pc:docMk/>
+            <pc:sldMk cId="232067652" sldId="256"/>
+            <ac:spMk id="3" creationId="{6C225487-988F-45CE-F517-0CB33C1D0A1E}"/>
+          </ac:spMkLst>
+        </pc:spChg>
         <pc:spChg chg="del">
           <ac:chgData name="Sehgal, Vinit" userId="ef721694-8436-4df6-8b9b-be9691359d6c" providerId="ADAL" clId="{26AAD9E8-4C42-4DE7-94A5-14A70A065374}" dt="2024-02-06T14:13:25.785" v="1" actId="478"/>
           <ac:spMkLst>
@@ -199,6 +207,14 @@
             <ac:spMk id="12" creationId="{C6A947DB-80FD-5F6C-0A75-11F77035F751}"/>
           </ac:spMkLst>
         </pc:spChg>
+        <pc:spChg chg="add mod">
+          <ac:chgData name="Sehgal, Vinit" userId="ef721694-8436-4df6-8b9b-be9691359d6c" providerId="ADAL" clId="{26AAD9E8-4C42-4DE7-94A5-14A70A065374}" dt="2024-02-07T12:39:06.825" v="866" actId="14100"/>
+          <ac:spMkLst>
+            <pc:docMk/>
+            <pc:sldMk cId="232067652" sldId="256"/>
+            <ac:spMk id="13" creationId="{482D95EE-F81B-FAB9-B402-BA9924FB746C}"/>
+          </ac:spMkLst>
+        </pc:spChg>
         <pc:spChg chg="add del mod">
           <ac:chgData name="Sehgal, Vinit" userId="ef721694-8436-4df6-8b9b-be9691359d6c" providerId="ADAL" clId="{26AAD9E8-4C42-4DE7-94A5-14A70A065374}" dt="2024-02-06T14:34:49.208" v="322" actId="478"/>
           <ac:spMkLst>
@@ -352,7 +368,7 @@
           </ac:spMkLst>
         </pc:spChg>
         <pc:spChg chg="add mod">
-          <ac:chgData name="Sehgal, Vinit" userId="ef721694-8436-4df6-8b9b-be9691359d6c" providerId="ADAL" clId="{26AAD9E8-4C42-4DE7-94A5-14A70A065374}" dt="2024-02-06T15:07:30" v="821" actId="1037"/>
+          <ac:chgData name="Sehgal, Vinit" userId="ef721694-8436-4df6-8b9b-be9691359d6c" providerId="ADAL" clId="{26AAD9E8-4C42-4DE7-94A5-14A70A065374}" dt="2024-02-07T12:38:24.263" v="844" actId="14100"/>
           <ac:spMkLst>
             <pc:docMk/>
             <pc:sldMk cId="232067652" sldId="256"/>
@@ -368,7 +384,7 @@
           </ac:spMkLst>
         </pc:spChg>
         <pc:spChg chg="add mod topLvl">
-          <ac:chgData name="Sehgal, Vinit" userId="ef721694-8436-4df6-8b9b-be9691359d6c" providerId="ADAL" clId="{26AAD9E8-4C42-4DE7-94A5-14A70A065374}" dt="2024-02-06T15:07:30" v="821" actId="1037"/>
+          <ac:chgData name="Sehgal, Vinit" userId="ef721694-8436-4df6-8b9b-be9691359d6c" providerId="ADAL" clId="{26AAD9E8-4C42-4DE7-94A5-14A70A065374}" dt="2024-02-07T12:38:31.059" v="854" actId="20577"/>
           <ac:spMkLst>
             <pc:docMk/>
             <pc:sldMk cId="232067652" sldId="256"/>
@@ -1088,7 +1104,7 @@
           <a:p>
             <a:fld id="{BE439EB3-F077-416F-BE9D-E5A16F54A2DF}" type="datetimeFigureOut">
               <a:rPr lang="en-US" smtClean="0"/>
-              <a:t>2/6/2024</a:t>
+              <a:t>2/7/2024</a:t>
             </a:fld>
             <a:endParaRPr lang="en-US"/>
           </a:p>
@@ -1286,7 +1302,7 @@
           <a:p>
             <a:fld id="{BE439EB3-F077-416F-BE9D-E5A16F54A2DF}" type="datetimeFigureOut">
               <a:rPr lang="en-US" smtClean="0"/>
-              <a:t>2/6/2024</a:t>
+              <a:t>2/7/2024</a:t>
             </a:fld>
             <a:endParaRPr lang="en-US"/>
           </a:p>
@@ -1494,7 +1510,7 @@
           <a:p>
             <a:fld id="{BE439EB3-F077-416F-BE9D-E5A16F54A2DF}" type="datetimeFigureOut">
               <a:rPr lang="en-US" smtClean="0"/>
-              <a:t>2/6/2024</a:t>
+              <a:t>2/7/2024</a:t>
             </a:fld>
             <a:endParaRPr lang="en-US"/>
           </a:p>
@@ -1692,7 +1708,7 @@
           <a:p>
             <a:fld id="{BE439EB3-F077-416F-BE9D-E5A16F54A2DF}" type="datetimeFigureOut">
               <a:rPr lang="en-US" smtClean="0"/>
-              <a:t>2/6/2024</a:t>
+              <a:t>2/7/2024</a:t>
             </a:fld>
             <a:endParaRPr lang="en-US"/>
           </a:p>
@@ -1967,7 +1983,7 @@
           <a:p>
             <a:fld id="{BE439EB3-F077-416F-BE9D-E5A16F54A2DF}" type="datetimeFigureOut">
               <a:rPr lang="en-US" smtClean="0"/>
-              <a:t>2/6/2024</a:t>
+              <a:t>2/7/2024</a:t>
             </a:fld>
             <a:endParaRPr lang="en-US"/>
           </a:p>
@@ -2232,7 +2248,7 @@
           <a:p>
             <a:fld id="{BE439EB3-F077-416F-BE9D-E5A16F54A2DF}" type="datetimeFigureOut">
               <a:rPr lang="en-US" smtClean="0"/>
-              <a:t>2/6/2024</a:t>
+              <a:t>2/7/2024</a:t>
             </a:fld>
             <a:endParaRPr lang="en-US"/>
           </a:p>
@@ -2644,7 +2660,7 @@
           <a:p>
             <a:fld id="{BE439EB3-F077-416F-BE9D-E5A16F54A2DF}" type="datetimeFigureOut">
               <a:rPr lang="en-US" smtClean="0"/>
-              <a:t>2/6/2024</a:t>
+              <a:t>2/7/2024</a:t>
             </a:fld>
             <a:endParaRPr lang="en-US"/>
           </a:p>
@@ -2785,7 +2801,7 @@
           <a:p>
             <a:fld id="{BE439EB3-F077-416F-BE9D-E5A16F54A2DF}" type="datetimeFigureOut">
               <a:rPr lang="en-US" smtClean="0"/>
-              <a:t>2/6/2024</a:t>
+              <a:t>2/7/2024</a:t>
             </a:fld>
             <a:endParaRPr lang="en-US"/>
           </a:p>
@@ -2898,7 +2914,7 @@
           <a:p>
             <a:fld id="{BE439EB3-F077-416F-BE9D-E5A16F54A2DF}" type="datetimeFigureOut">
               <a:rPr lang="en-US" smtClean="0"/>
-              <a:t>2/6/2024</a:t>
+              <a:t>2/7/2024</a:t>
             </a:fld>
             <a:endParaRPr lang="en-US"/>
           </a:p>
@@ -3209,7 +3225,7 @@
           <a:p>
             <a:fld id="{BE439EB3-F077-416F-BE9D-E5A16F54A2DF}" type="datetimeFigureOut">
               <a:rPr lang="en-US" smtClean="0"/>
-              <a:t>2/6/2024</a:t>
+              <a:t>2/7/2024</a:t>
             </a:fld>
             <a:endParaRPr lang="en-US"/>
           </a:p>
@@ -3497,7 +3513,7 @@
           <a:p>
             <a:fld id="{BE439EB3-F077-416F-BE9D-E5A16F54A2DF}" type="datetimeFigureOut">
               <a:rPr lang="en-US" smtClean="0"/>
-              <a:t>2/6/2024</a:t>
+              <a:t>2/7/2024</a:t>
             </a:fld>
             <a:endParaRPr lang="en-US"/>
           </a:p>
@@ -3738,7 +3754,7 @@
           <a:p>
             <a:fld id="{BE439EB3-F077-416F-BE9D-E5A16F54A2DF}" type="datetimeFigureOut">
               <a:rPr lang="en-US" smtClean="0"/>
-              <a:t>2/6/2024</a:t>
+              <a:t>2/7/2024</a:t>
             </a:fld>
             <a:endParaRPr lang="en-US"/>
           </a:p>
@@ -4424,7 +4440,7 @@
         <p:spPr>
           <a:xfrm>
             <a:off x="3080943" y="1211420"/>
-            <a:ext cx="1515347" cy="307777"/>
+            <a:ext cx="1759271" cy="307777"/>
           </a:xfrm>
           <a:prstGeom prst="rect">
             <a:avLst/>
@@ -4438,10 +4454,10 @@
           <a:lstStyle/>
           <a:p>
             <a:r>
-              <a:rPr lang="en-US" sz="1400" dirty="0">
+              <a:rPr lang="en-US" sz="1400" i="1" dirty="0">
                 <a:latin typeface="Consolas" panose="020B0609020204030204" pitchFamily="49" charset="0"/>
               </a:rPr>
-              <a:t>aggregate</a:t>
+              <a:t>terra::aggregate</a:t>
             </a:r>
             <a:r>
               <a:rPr lang="en-US" sz="1400" dirty="0"/>
@@ -5824,15 +5840,18 @@
           <a:lstStyle/>
           <a:p>
             <a:r>
-              <a:rPr lang="en-US" sz="1400" dirty="0">
+              <a:rPr lang="en-US" sz="1400" i="1" dirty="0">
                 <a:latin typeface="Consolas" panose="020B0609020204030204" pitchFamily="49" charset="0"/>
               </a:rPr>
-              <a:t>disaggregate</a:t>
-            </a:r>
-            <a:r>
-              <a:rPr lang="en-US" sz="1400" dirty="0"/>
-              <a:t> </a:t>
-            </a:r>
+              <a:t>terra::</a:t>
+            </a:r>
+            <a:r>
+              <a:rPr lang="en-US" sz="1400" i="1" dirty="0" err="1">
+                <a:latin typeface="Consolas" panose="020B0609020204030204" pitchFamily="49" charset="0"/>
+              </a:rPr>
+              <a:t>disagg</a:t>
+            </a:r>
+            <a:endParaRPr lang="en-US" sz="1400" i="1" dirty="0"/>
           </a:p>
         </p:txBody>
       </p:sp>
@@ -6574,6 +6593,44 @@
           </a:fontRef>
         </p:style>
       </p:cxnSp>
+      <p:sp>
+        <p:nvSpPr>
+          <p:cNvPr id="13" name="TextBox 12">
+            <a:extLst>
+              <a:ext uri="{FF2B5EF4-FFF2-40B4-BE49-F238E27FC236}">
+                <a16:creationId xmlns:a16="http://schemas.microsoft.com/office/drawing/2014/main" id="{482D95EE-F81B-FAB9-B402-BA9924FB746C}"/>
+              </a:ext>
+            </a:extLst>
+          </p:cNvPr>
+          <p:cNvSpPr txBox="1"/>
+          <p:nvPr/>
+        </p:nvSpPr>
+        <p:spPr>
+          <a:xfrm>
+            <a:off x="3079137" y="5739106"/>
+            <a:ext cx="1823055" cy="307777"/>
+          </a:xfrm>
+          <a:prstGeom prst="rect">
+            <a:avLst/>
+          </a:prstGeom>
+          <a:noFill/>
+        </p:spPr>
+        <p:txBody>
+          <a:bodyPr wrap="square" rtlCol="0">
+            <a:spAutoFit/>
+          </a:bodyPr>
+          <a:lstStyle/>
+          <a:p>
+            <a:r>
+              <a:rPr lang="en-US" sz="1400" i="1" dirty="0">
+                <a:latin typeface="Consolas" panose="020B0609020204030204" pitchFamily="49" charset="0"/>
+              </a:rPr>
+              <a:t>terra::resample</a:t>
+            </a:r>
+            <a:endParaRPr lang="en-US" sz="1400" i="1" dirty="0"/>
+          </a:p>
+        </p:txBody>
+      </p:sp>
     </p:spTree>
     <p:extLst>
       <p:ext uri="{BB962C8B-B14F-4D97-AF65-F5344CB8AC3E}">

</xml_diff>

<commit_message>
Update flash card ch 4
</commit_message>
<xml_diff>
--- a/plots.pptx
+++ b/plots.pptx
@@ -126,7 +126,7 @@
 <file path=ppt/revisionInfo.xml><?xml version="1.0" encoding="utf-8"?>
 <p1510:revInfo xmlns:a="http://schemas.openxmlformats.org/drawingml/2006/main" xmlns:r="http://schemas.openxmlformats.org/officeDocument/2006/relationships" xmlns:p1510="http://schemas.microsoft.com/office/powerpoint/2015/10/main">
   <p1510:revLst>
-    <p1510:client id="{26AAD9E8-4C42-4DE7-94A5-14A70A065374}" v="662" dt="2024-02-21T14:50:05.202"/>
+    <p1510:client id="{26AAD9E8-4C42-4DE7-94A5-14A70A065374}" v="663" dt="2024-02-21T22:39:23.346"/>
   </p1510:revLst>
 </p1510:revInfo>
 </file>
@@ -136,7 +136,7 @@
   <pc:docChgLst>
     <pc:chgData name="Sehgal, Vinit" userId="ef721694-8436-4df6-8b9b-be9691359d6c" providerId="ADAL" clId="{26AAD9E8-4C42-4DE7-94A5-14A70A065374}"/>
     <pc:docChg chg="undo redo custSel addSld modSld">
-      <pc:chgData name="Sehgal, Vinit" userId="ef721694-8436-4df6-8b9b-be9691359d6c" providerId="ADAL" clId="{26AAD9E8-4C42-4DE7-94A5-14A70A065374}" dt="2024-02-21T14:50:26.835" v="3641" actId="14100"/>
+      <pc:chgData name="Sehgal, Vinit" userId="ef721694-8436-4df6-8b9b-be9691359d6c" providerId="ADAL" clId="{26AAD9E8-4C42-4DE7-94A5-14A70A065374}" dt="2024-02-21T22:47:04.506" v="3915" actId="6549"/>
       <pc:docMkLst>
         <pc:docMk/>
       </pc:docMkLst>
@@ -987,7 +987,7 @@
         </pc:spChg>
       </pc:sldChg>
       <pc:sldChg chg="addSp delSp modSp new mod">
-        <pc:chgData name="Sehgal, Vinit" userId="ef721694-8436-4df6-8b9b-be9691359d6c" providerId="ADAL" clId="{26AAD9E8-4C42-4DE7-94A5-14A70A065374}" dt="2024-02-21T13:36:30.477" v="3407" actId="478"/>
+        <pc:chgData name="Sehgal, Vinit" userId="ef721694-8436-4df6-8b9b-be9691359d6c" providerId="ADAL" clId="{26AAD9E8-4C42-4DE7-94A5-14A70A065374}" dt="2024-02-21T22:39:23.346" v="3642" actId="20577"/>
         <pc:sldMkLst>
           <pc:docMk/>
           <pc:sldMk cId="3913206283" sldId="258"/>
@@ -1025,7 +1025,7 @@
           </ac:spMkLst>
         </pc:spChg>
         <pc:spChg chg="add mod">
-          <ac:chgData name="Sehgal, Vinit" userId="ef721694-8436-4df6-8b9b-be9691359d6c" providerId="ADAL" clId="{26AAD9E8-4C42-4DE7-94A5-14A70A065374}" dt="2024-02-20T16:56:55.426" v="1898" actId="20577"/>
+          <ac:chgData name="Sehgal, Vinit" userId="ef721694-8436-4df6-8b9b-be9691359d6c" providerId="ADAL" clId="{26AAD9E8-4C42-4DE7-94A5-14A70A065374}" dt="2024-02-21T22:39:23.346" v="3642" actId="20577"/>
           <ac:spMkLst>
             <pc:docMk/>
             <pc:sldMk cId="3913206283" sldId="258"/>
@@ -1946,7 +1946,7 @@
         </pc:cxnChg>
       </pc:sldChg>
       <pc:sldChg chg="addSp delSp modSp new mod">
-        <pc:chgData name="Sehgal, Vinit" userId="ef721694-8436-4df6-8b9b-be9691359d6c" providerId="ADAL" clId="{26AAD9E8-4C42-4DE7-94A5-14A70A065374}" dt="2024-02-21T14:50:26.835" v="3641" actId="14100"/>
+        <pc:chgData name="Sehgal, Vinit" userId="ef721694-8436-4df6-8b9b-be9691359d6c" providerId="ADAL" clId="{26AAD9E8-4C42-4DE7-94A5-14A70A065374}" dt="2024-02-21T22:47:04.506" v="3915" actId="6549"/>
         <pc:sldMkLst>
           <pc:docMk/>
           <pc:sldMk cId="789022678" sldId="267"/>
@@ -1968,7 +1968,7 @@
           </ac:spMkLst>
         </pc:spChg>
         <pc:spChg chg="add mod">
-          <ac:chgData name="Sehgal, Vinit" userId="ef721694-8436-4df6-8b9b-be9691359d6c" providerId="ADAL" clId="{26AAD9E8-4C42-4DE7-94A5-14A70A065374}" dt="2024-02-21T14:50:26.835" v="3641" actId="14100"/>
+          <ac:chgData name="Sehgal, Vinit" userId="ef721694-8436-4df6-8b9b-be9691359d6c" providerId="ADAL" clId="{26AAD9E8-4C42-4DE7-94A5-14A70A065374}" dt="2024-02-21T22:47:04.506" v="3915" actId="6549"/>
           <ac:spMkLst>
             <pc:docMk/>
             <pc:sldMk cId="789022678" sldId="267"/>
@@ -7732,13 +7732,13 @@
                         <a:rPr lang="en-US" i="1" smtClean="0">
                           <a:latin typeface="Cambria Math" panose="02040503050406030204" pitchFamily="18" charset="0"/>
                         </a:rPr>
-                        <m:t>=                </m:t>
+                        <m:t>=                    </m:t>
                       </m:r>
                       <m:r>
                         <a:rPr lang="en-US" b="0" i="1" smtClean="0">
                           <a:latin typeface="Cambria Math" panose="02040503050406030204" pitchFamily="18" charset="0"/>
                         </a:rPr>
-                        <m:t>       =</m:t>
+                        <m:t>   =</m:t>
                       </m:r>
                       <m:d>
                         <m:dPr>
@@ -10197,8 +10197,8 @@
           <a:chExt cx="0" cy="0"/>
         </a:xfrm>
       </p:grpSpPr>
-      <mc:AlternateContent xmlns:mc="http://schemas.openxmlformats.org/markup-compatibility/2006" xmlns:a14="http://schemas.microsoft.com/office/drawing/2010/main">
-        <mc:Choice Requires="a14">
+      <mc:AlternateContent xmlns:mc="http://schemas.openxmlformats.org/markup-compatibility/2006">
+        <mc:Choice xmlns:a14="http://schemas.microsoft.com/office/drawing/2010/main" Requires="a14">
           <p:sp>
             <p:nvSpPr>
               <p:cNvPr id="8" name="TextBox 7">
@@ -10461,7 +10461,13 @@
                                 <a:rPr lang="en-US" sz="2800" b="0" i="0" smtClean="0">
                                   <a:latin typeface="Cambria Math" panose="02040503050406030204" pitchFamily="18" charset="0"/>
                                 </a:rPr>
-                                <m:t>+2</m:t>
+                                <m:t>+</m:t>
+                              </m:r>
+                              <m:r>
+                                <a:rPr lang="en-US" sz="2800" b="0" i="0" smtClean="0">
+                                  <a:latin typeface="Cambria Math" panose="02040503050406030204" pitchFamily="18" charset="0"/>
+                                </a:rPr>
+                                <m:t>1</m:t>
                               </m:r>
                             </m:e>
                           </m:mr>
@@ -10656,7 +10662,7 @@
             </p:txBody>
           </p:sp>
         </mc:Choice>
-        <mc:Fallback xmlns="">
+        <mc:Fallback>
           <p:sp>
             <p:nvSpPr>
               <p:cNvPr id="8" name="TextBox 7">
@@ -15333,8 +15339,8 @@
         </p:nvSpPr>
         <p:spPr>
           <a:xfrm>
-            <a:off x="523783" y="1429305"/>
-            <a:ext cx="5237825" cy="1477328"/>
+            <a:off x="523784" y="1429305"/>
+            <a:ext cx="6604986" cy="2308324"/>
           </a:xfrm>
           <a:prstGeom prst="rect">
             <a:avLst/>
@@ -15358,7 +15364,7 @@
                 <a:ea typeface="CMU Bright" panose="02000603000000000000" pitchFamily="2" charset="0"/>
                 <a:cs typeface="CMU Bright" panose="02000603000000000000" pitchFamily="2" charset="0"/>
               </a:rPr>
-              <a:t>FLASH CARD</a:t>
+              <a:t>FLASH CARD (Raster Arithmetic &amp; Stats)</a:t>
             </a:r>
           </a:p>
           <a:p>
@@ -15381,7 +15387,29 @@
                 <a:ea typeface="CMU Bright" panose="02000603000000000000" pitchFamily="2" charset="0"/>
                 <a:cs typeface="CMU Bright" panose="02000603000000000000" pitchFamily="2" charset="0"/>
               </a:rPr>
-              <a:t>terra::rast                Import raster</a:t>
+              <a:t>terra::</a:t>
+            </a:r>
+            <a:r>
+              <a:rPr lang="en-US" dirty="0" err="1">
+                <a:solidFill>
+                  <a:schemeClr val="bg1"/>
+                </a:solidFill>
+                <a:latin typeface="Avenir Next LT Pro" panose="020B0504020202020204" pitchFamily="34" charset="0"/>
+                <a:ea typeface="CMU Bright" panose="02000603000000000000" pitchFamily="2" charset="0"/>
+                <a:cs typeface="CMU Bright" panose="02000603000000000000" pitchFamily="2" charset="0"/>
+              </a:rPr>
+              <a:t>rast</a:t>
+            </a:r>
+            <a:r>
+              <a:rPr lang="en-US" dirty="0">
+                <a:solidFill>
+                  <a:schemeClr val="bg1"/>
+                </a:solidFill>
+                <a:latin typeface="Avenir Next LT Pro" panose="020B0504020202020204" pitchFamily="34" charset="0"/>
+                <a:ea typeface="CMU Bright" panose="02000603000000000000" pitchFamily="2" charset="0"/>
+                <a:cs typeface="CMU Bright" panose="02000603000000000000" pitchFamily="2" charset="0"/>
+              </a:rPr>
+              <a:t>                                    Import raster</a:t>
             </a:r>
           </a:p>
           <a:p>
@@ -15394,7 +15422,7 @@
                 <a:ea typeface="CMU Bright" panose="02000603000000000000" pitchFamily="2" charset="0"/>
                 <a:cs typeface="CMU Bright" panose="02000603000000000000" pitchFamily="2" charset="0"/>
               </a:rPr>
-              <a:t>terra:: global          Apply function on raster layer</a:t>
+              <a:t>terra:: global                              Apply function on raster layer</a:t>
             </a:r>
             <a:br>
               <a:rPr lang="en-US" dirty="0">
@@ -15415,7 +15443,128 @@
                 <a:ea typeface="CMU Bright" panose="02000603000000000000" pitchFamily="2" charset="0"/>
                 <a:cs typeface="CMU Bright" panose="02000603000000000000" pitchFamily="2" charset="0"/>
               </a:rPr>
-              <a:t>terra::values           Generate array of raster cells</a:t>
+              <a:t>terra::values                               Generate array of raster cells</a:t>
+            </a:r>
+          </a:p>
+          <a:p>
+            <a:endParaRPr lang="en-US" dirty="0">
+              <a:solidFill>
+                <a:schemeClr val="bg1"/>
+              </a:solidFill>
+              <a:latin typeface="Avenir Next LT Pro" panose="020B0504020202020204" pitchFamily="34" charset="0"/>
+              <a:ea typeface="CMU Bright" panose="02000603000000000000" pitchFamily="2" charset="0"/>
+              <a:cs typeface="CMU Bright" panose="02000603000000000000" pitchFamily="2" charset="0"/>
+            </a:endParaRPr>
+          </a:p>
+          <a:p>
+            <a:r>
+              <a:rPr lang="en-US" b="1" i="1" dirty="0">
+                <a:solidFill>
+                  <a:schemeClr val="bg1"/>
+                </a:solidFill>
+                <a:latin typeface="Avenir Next LT Pro" panose="020B0504020202020204" pitchFamily="34" charset="0"/>
+                <a:ea typeface="CMU Bright" panose="02000603000000000000" pitchFamily="2" charset="0"/>
+                <a:cs typeface="CMU Bright" panose="02000603000000000000" pitchFamily="2" charset="0"/>
+              </a:rPr>
+              <a:t>A</a:t>
+            </a:r>
+            <a:r>
+              <a:rPr lang="en-US" dirty="0">
+                <a:solidFill>
+                  <a:schemeClr val="bg1"/>
+                </a:solidFill>
+                <a:latin typeface="Avenir Next LT Pro" panose="020B0504020202020204" pitchFamily="34" charset="0"/>
+                <a:ea typeface="CMU Bright" panose="02000603000000000000" pitchFamily="2" charset="0"/>
+                <a:cs typeface="CMU Bright" panose="02000603000000000000" pitchFamily="2" charset="0"/>
+              </a:rPr>
+              <a:t> [</a:t>
+            </a:r>
+            <a:r>
+              <a:rPr lang="en-US" b="1" i="1" dirty="0">
+                <a:solidFill>
+                  <a:schemeClr val="bg1"/>
+                </a:solidFill>
+                <a:latin typeface="Avenir Next LT Pro" panose="020B0504020202020204" pitchFamily="34" charset="0"/>
+                <a:ea typeface="CMU Bright" panose="02000603000000000000" pitchFamily="2" charset="0"/>
+                <a:cs typeface="CMU Bright" panose="02000603000000000000" pitchFamily="2" charset="0"/>
+              </a:rPr>
+              <a:t>A</a:t>
+            </a:r>
+            <a:r>
+              <a:rPr lang="en-US" dirty="0">
+                <a:solidFill>
+                  <a:schemeClr val="bg1"/>
+                </a:solidFill>
+                <a:latin typeface="Avenir Next LT Pro" panose="020B0504020202020204" pitchFamily="34" charset="0"/>
+                <a:ea typeface="CMU Bright" panose="02000603000000000000" pitchFamily="2" charset="0"/>
+                <a:cs typeface="CMU Bright" panose="02000603000000000000" pitchFamily="2" charset="0"/>
+              </a:rPr>
+              <a:t> &lt; value] = </a:t>
+            </a:r>
+            <a:r>
+              <a:rPr lang="en-US" dirty="0" err="1">
+                <a:solidFill>
+                  <a:schemeClr val="bg1"/>
+                </a:solidFill>
+                <a:latin typeface="Avenir Next LT Pro" panose="020B0504020202020204" pitchFamily="34" charset="0"/>
+                <a:ea typeface="CMU Bright" panose="02000603000000000000" pitchFamily="2" charset="0"/>
+                <a:cs typeface="CMU Bright" panose="02000603000000000000" pitchFamily="2" charset="0"/>
+              </a:rPr>
+              <a:t>new_value</a:t>
+            </a:r>
+            <a:r>
+              <a:rPr lang="en-US" dirty="0">
+                <a:solidFill>
+                  <a:schemeClr val="bg1"/>
+                </a:solidFill>
+                <a:latin typeface="Avenir Next LT Pro" panose="020B0504020202020204" pitchFamily="34" charset="0"/>
+                <a:ea typeface="CMU Bright" panose="02000603000000000000" pitchFamily="2" charset="0"/>
+                <a:cs typeface="CMU Bright" panose="02000603000000000000" pitchFamily="2" charset="0"/>
+              </a:rPr>
+              <a:t>     Replace raster cell values based</a:t>
+            </a:r>
+            <a:br>
+              <a:rPr lang="en-US" dirty="0">
+                <a:solidFill>
+                  <a:schemeClr val="bg1"/>
+                </a:solidFill>
+                <a:latin typeface="Avenir Next LT Pro" panose="020B0504020202020204" pitchFamily="34" charset="0"/>
+                <a:ea typeface="CMU Bright" panose="02000603000000000000" pitchFamily="2" charset="0"/>
+                <a:cs typeface="CMU Bright" panose="02000603000000000000" pitchFamily="2" charset="0"/>
+              </a:rPr>
+            </a:br>
+            <a:r>
+              <a:rPr lang="en-US" dirty="0">
+                <a:solidFill>
+                  <a:schemeClr val="bg1"/>
+                </a:solidFill>
+                <a:latin typeface="Avenir Next LT Pro" panose="020B0504020202020204" pitchFamily="34" charset="0"/>
+                <a:ea typeface="CMU Bright" panose="02000603000000000000" pitchFamily="2" charset="0"/>
+                <a:cs typeface="CMU Bright" panose="02000603000000000000" pitchFamily="2" charset="0"/>
+              </a:rPr>
+              <a:t>			</a:t>
+            </a:r>
+            <a:r>
+              <a:rPr lang="en-US">
+                <a:solidFill>
+                  <a:schemeClr val="bg1"/>
+                </a:solidFill>
+                <a:latin typeface="Avenir Next LT Pro" panose="020B0504020202020204" pitchFamily="34" charset="0"/>
+                <a:ea typeface="CMU Bright" panose="02000603000000000000" pitchFamily="2" charset="0"/>
+                <a:cs typeface="CMU Bright" panose="02000603000000000000" pitchFamily="2" charset="0"/>
+              </a:rPr>
+              <a:t>     on </a:t>
+            </a:r>
+            <a:r>
+              <a:rPr lang="en-US" dirty="0">
+                <a:solidFill>
+                  <a:schemeClr val="bg1"/>
+                </a:solidFill>
+                <a:latin typeface="Avenir Next LT Pro" panose="020B0504020202020204" pitchFamily="34" charset="0"/>
+                <a:ea typeface="CMU Bright" panose="02000603000000000000" pitchFamily="2" charset="0"/>
+                <a:cs typeface="CMU Bright" panose="02000603000000000000" pitchFamily="2" charset="0"/>
+              </a:rPr>
+              <a:t>logical operator        </a:t>
             </a:r>
           </a:p>
         </p:txBody>

</xml_diff>